<commit_message>
cap nhat bao cao
</commit_message>
<xml_diff>
--- a/RequirementsAnalysis/RP_PTPMCN06.pptx
+++ b/RequirementsAnalysis/RP_PTPMCN06.pptx
@@ -353,7 +353,7 @@
                 <a:tabLst/>
                 <a:defRPr/>
               </a:pPr>
-              <a:t>11/21/2019</a:t>
+              <a:t>11/22/2019</a:t>
             </a:fld>
             <a:endParaRPr kumimoji="0" lang="en-US" sz="900" b="0" i="0" u="none" strike="noStrike" kern="1200" cap="none" spc="0" normalizeH="0" baseline="0" noProof="0">
               <a:ln>
@@ -688,7 +688,7 @@
                 <a:tabLst/>
                 <a:defRPr/>
               </a:pPr>
-              <a:t>11/21/2019</a:t>
+              <a:t>11/22/2019</a:t>
             </a:fld>
             <a:endParaRPr kumimoji="0" lang="en-US" sz="900" b="0" i="0" u="none" strike="noStrike" kern="1200" cap="none" spc="0" normalizeH="0" baseline="0" noProof="0">
               <a:ln>
@@ -1026,7 +1026,7 @@
                 <a:tabLst/>
                 <a:defRPr/>
               </a:pPr>
-              <a:t>11/21/2019</a:t>
+              <a:t>11/22/2019</a:t>
             </a:fld>
             <a:endParaRPr kumimoji="0" lang="en-US" sz="900" b="0" i="0" u="none" strike="noStrike" kern="1200" cap="none" spc="0" normalizeH="0" baseline="0" noProof="0">
               <a:ln>
@@ -1354,7 +1354,7 @@
                 <a:tabLst/>
                 <a:defRPr/>
               </a:pPr>
-              <a:t>11/21/2019</a:t>
+              <a:t>11/22/2019</a:t>
             </a:fld>
             <a:endParaRPr kumimoji="0" lang="en-US" sz="900" b="0" i="0" u="none" strike="noStrike" kern="1200" cap="none" spc="0" normalizeH="0" baseline="0" noProof="0">
               <a:ln>
@@ -1766,7 +1766,7 @@
                 <a:tabLst/>
                 <a:defRPr/>
               </a:pPr>
-              <a:t>11/21/2019</a:t>
+              <a:t>11/22/2019</a:t>
             </a:fld>
             <a:endParaRPr kumimoji="0" lang="en-US" sz="900" b="0" i="0" u="none" strike="noStrike" kern="1200" cap="none" spc="0" normalizeH="0" baseline="0" noProof="0">
               <a:ln>
@@ -2155,7 +2155,7 @@
                 <a:tabLst/>
                 <a:defRPr/>
               </a:pPr>
-              <a:t>11/21/2019</a:t>
+              <a:t>11/22/2019</a:t>
             </a:fld>
             <a:endParaRPr kumimoji="0" lang="en-US" sz="900" b="0" i="0" u="none" strike="noStrike" kern="1200" cap="none" spc="0" normalizeH="0" baseline="0" noProof="0">
               <a:ln>
@@ -2679,7 +2679,7 @@
                 <a:tabLst/>
                 <a:defRPr/>
               </a:pPr>
-              <a:t>11/21/2019</a:t>
+              <a:t>11/22/2019</a:t>
             </a:fld>
             <a:endParaRPr kumimoji="0" lang="en-US" sz="900" b="0" i="0" u="none" strike="noStrike" kern="1200" cap="none" spc="0" normalizeH="0" baseline="0" noProof="0">
               <a:ln>
@@ -2948,7 +2948,7 @@
                 <a:tabLst/>
                 <a:defRPr/>
               </a:pPr>
-              <a:t>11/21/2019</a:t>
+              <a:t>11/22/2019</a:t>
             </a:fld>
             <a:endParaRPr kumimoji="0" lang="en-US" sz="900" b="0" i="0" u="none" strike="noStrike" kern="1200" cap="none" spc="0" normalizeH="0" baseline="0" noProof="0">
               <a:ln>
@@ -3217,7 +3217,7 @@
                 <a:tabLst/>
                 <a:defRPr/>
               </a:pPr>
-              <a:t>11/21/2019</a:t>
+              <a:t>11/22/2019</a:t>
             </a:fld>
             <a:endParaRPr kumimoji="0" lang="en-US" sz="900" b="0" i="0" u="none" strike="noStrike" kern="1200" cap="none" spc="0" normalizeH="0" baseline="0" noProof="0">
               <a:ln>
@@ -3652,7 +3652,7 @@
                 <a:tabLst/>
                 <a:defRPr/>
               </a:pPr>
-              <a:t>11/21/2019</a:t>
+              <a:t>11/22/2019</a:t>
             </a:fld>
             <a:endParaRPr kumimoji="0" lang="en-US" sz="900" b="0" i="0" u="none" strike="noStrike" kern="1200" cap="none" spc="0" normalizeH="0" baseline="0" noProof="0">
               <a:ln>
@@ -4067,7 +4067,7 @@
                 <a:tabLst/>
                 <a:defRPr/>
               </a:pPr>
-              <a:t>11/21/2019</a:t>
+              <a:t>11/22/2019</a:t>
             </a:fld>
             <a:endParaRPr kumimoji="0" lang="en-US" sz="900" b="0" i="0" u="none" strike="noStrike" kern="1200" cap="none" spc="0" normalizeH="0" baseline="0" noProof="0">
               <a:ln>
@@ -4447,7 +4447,7 @@
                 <a:tabLst/>
                 <a:defRPr/>
               </a:pPr>
-              <a:t>11/21/2019</a:t>
+              <a:t>11/22/2019</a:t>
             </a:fld>
             <a:endParaRPr kumimoji="0" lang="en-US" sz="900" b="0" i="0" u="none" strike="noStrike" kern="1200" cap="none" spc="0" normalizeH="0" baseline="0" noProof="0">
               <a:ln>
@@ -5498,19 +5498,8 @@
                 <a:latin typeface="Times New Roman" panose="02020603050405020304" pitchFamily="18" charset="0"/>
                 <a:cs typeface="Times New Roman" panose="02020603050405020304" pitchFamily="18" charset="0"/>
               </a:rPr>
-              <a:t>PHÁT TRIỂN PHẦN MỀM </a:t>
-            </a:r>
-            <a:r>
-              <a:rPr lang="en-US" sz="2800" b="1" dirty="0" smtClean="0">
-                <a:latin typeface="Times New Roman" panose="02020603050405020304" pitchFamily="18" charset="0"/>
-                <a:cs typeface="Times New Roman" panose="02020603050405020304" pitchFamily="18" charset="0"/>
-              </a:rPr>
-              <a:t>CHUYÊN NGHIỆP</a:t>
-            </a:r>
-            <a:endParaRPr lang="en-US" sz="2800" b="1" dirty="0" smtClean="0">
-              <a:latin typeface="Times New Roman" panose="02020603050405020304" pitchFamily="18" charset="0"/>
-              <a:cs typeface="Times New Roman" panose="02020603050405020304" pitchFamily="18" charset="0"/>
-            </a:endParaRPr>
+              <a:t>PHÁT TRIỂN PHẦN MỀM CHUYÊN NGHIỆP</a:t>
+            </a:r>
           </a:p>
           <a:p>
             <a:pPr algn="ctr"/>
@@ -5550,7 +5539,7 @@
         </p:nvGraphicFramePr>
         <p:xfrm>
           <a:off x="3336001" y="4340837"/>
-          <a:ext cx="6527018" cy="2015515"/>
+          <a:ext cx="6527018" cy="1948078"/>
         </p:xfrm>
         <a:graphic>
           <a:graphicData uri="http://schemas.openxmlformats.org/drawingml/2006/table">
@@ -6119,10 +6108,6 @@
                         </a:rPr>
                         <a:t>Phạm Quang Thành - 20163722</a:t>
                       </a:r>
-                      <a:endParaRPr lang="en-US" sz="1600" baseline="0" dirty="0" smtClean="0">
-                        <a:latin typeface="Times New Roman" panose="02020603050405020304" pitchFamily="18" charset="0"/>
-                        <a:cs typeface="Times New Roman" panose="02020603050405020304" pitchFamily="18" charset="0"/>
-                      </a:endParaRPr>
                     </a:p>
                     <a:p>
                       <a:r>
@@ -6132,10 +6117,6 @@
                         </a:rPr>
                         <a:t>Cao Văn Duy - 20160750</a:t>
                       </a:r>
-                      <a:endParaRPr lang="en-US" sz="1600" baseline="0" dirty="0" smtClean="0">
-                        <a:latin typeface="Times New Roman" panose="02020603050405020304" pitchFamily="18" charset="0"/>
-                        <a:cs typeface="Times New Roman" panose="02020603050405020304" pitchFamily="18" charset="0"/>
-                      </a:endParaRPr>
                     </a:p>
                   </a:txBody>
                   <a:tcPr marL="68580" marR="68580" marT="0" marB="0">
@@ -6529,28 +6510,7 @@
                 <a:latin typeface="Times New Roman" panose="02020603050405020304" pitchFamily="18" charset="0"/>
                 <a:cs typeface="Times New Roman" panose="02020603050405020304" pitchFamily="18" charset="0"/>
               </a:rPr>
-              <a:t>Cảm ơn </a:t>
-            </a:r>
-            <a:r>
-              <a:rPr lang="en-US" sz="3600" b="1" dirty="0" smtClean="0">
-                <a:latin typeface="Times New Roman" panose="02020603050405020304" pitchFamily="18" charset="0"/>
-                <a:cs typeface="Times New Roman" panose="02020603050405020304" pitchFamily="18" charset="0"/>
-              </a:rPr>
-              <a:t>thầy</a:t>
-            </a:r>
-            <a:r>
-              <a:rPr lang="en-US" sz="3600" b="1" dirty="0" smtClean="0">
-                <a:latin typeface="Times New Roman" panose="02020603050405020304" pitchFamily="18" charset="0"/>
-                <a:cs typeface="Times New Roman" panose="02020603050405020304" pitchFamily="18" charset="0"/>
-              </a:rPr>
-              <a:t> </a:t>
-            </a:r>
-            <a:r>
-              <a:rPr lang="en-US" sz="3600" b="1" dirty="0" smtClean="0">
-                <a:latin typeface="Times New Roman" panose="02020603050405020304" pitchFamily="18" charset="0"/>
-                <a:cs typeface="Times New Roman" panose="02020603050405020304" pitchFamily="18" charset="0"/>
-              </a:rPr>
-              <a:t>và các bạn đã lắng nghe !</a:t>
+              <a:t>Cảm ơn thầy và các bạn đã lắng nghe !</a:t>
             </a:r>
             <a:endParaRPr lang="en-US" sz="3600" b="1" dirty="0">
               <a:latin typeface="Times New Roman" panose="02020603050405020304" pitchFamily="18" charset="0"/>
@@ -6938,21 +6898,7 @@
                 <a:latin typeface="Times New Roman" panose="02020603050405020304" pitchFamily="18" charset="0"/>
                 <a:cs typeface="Times New Roman" panose="02020603050405020304" pitchFamily="18" charset="0"/>
               </a:rPr>
-              <a:t>1</a:t>
-            </a:r>
-            <a:r>
-              <a:rPr lang="en-US" dirty="0" smtClean="0">
-                <a:latin typeface="Times New Roman" panose="02020603050405020304" pitchFamily="18" charset="0"/>
-                <a:cs typeface="Times New Roman" panose="02020603050405020304" pitchFamily="18" charset="0"/>
-              </a:rPr>
-              <a:t>. </a:t>
-            </a:r>
-            <a:r>
-              <a:rPr lang="en-US" dirty="0" smtClean="0">
-                <a:latin typeface="Times New Roman" panose="02020603050405020304" pitchFamily="18" charset="0"/>
-                <a:cs typeface="Times New Roman" panose="02020603050405020304" pitchFamily="18" charset="0"/>
-              </a:rPr>
-              <a:t>Phân tích yêu cầu phần mềm</a:t>
+              <a:t>1. Phân tích yêu cầu phần mềm</a:t>
             </a:r>
             <a:endParaRPr lang="en-US" dirty="0">
               <a:latin typeface="Times New Roman" panose="02020603050405020304" pitchFamily="18" charset="0"/>
@@ -7134,14 +7080,7 @@
                 <a:latin typeface="Times New Roman" panose="02020603050405020304" pitchFamily="18" charset="0"/>
                 <a:cs typeface="Times New Roman" panose="02020603050405020304" pitchFamily="18" charset="0"/>
               </a:rPr>
-              <a:t>1</a:t>
-            </a:r>
-            <a:r>
-              <a:rPr lang="en-US" dirty="0" smtClean="0">
-                <a:latin typeface="Times New Roman" panose="02020603050405020304" pitchFamily="18" charset="0"/>
-                <a:cs typeface="Times New Roman" panose="02020603050405020304" pitchFamily="18" charset="0"/>
-              </a:rPr>
-              <a:t>. Phân tích yêu cầu phần mềm(tiếp)</a:t>
+              <a:t>1. Phân tích yêu cầu phần mềm(tiếp)</a:t>
             </a:r>
             <a:endParaRPr lang="en-US" dirty="0">
               <a:latin typeface="Times New Roman" panose="02020603050405020304" pitchFamily="18" charset="0"/>
@@ -7363,14 +7302,7 @@
                 <a:latin typeface="Times New Roman" panose="02020603050405020304" pitchFamily="18" charset="0"/>
                 <a:cs typeface="Times New Roman" panose="02020603050405020304" pitchFamily="18" charset="0"/>
               </a:rPr>
-              <a:t>2</a:t>
-            </a:r>
-            <a:r>
-              <a:rPr lang="en-US" dirty="0" smtClean="0">
-                <a:latin typeface="Times New Roman" panose="02020603050405020304" pitchFamily="18" charset="0"/>
-                <a:cs typeface="Times New Roman" panose="02020603050405020304" pitchFamily="18" charset="0"/>
-              </a:rPr>
-              <a:t>. Thiết kế kiến trúc</a:t>
+              <a:t>2. Thiết kế kiến trúc</a:t>
             </a:r>
             <a:endParaRPr lang="en-US" dirty="0">
               <a:latin typeface="Times New Roman" panose="02020603050405020304" pitchFamily="18" charset="0"/>
@@ -7901,14 +7833,7 @@
                 <a:latin typeface="Times New Roman" panose="02020603050405020304" pitchFamily="18" charset="0"/>
                 <a:cs typeface="Times New Roman" panose="02020603050405020304" pitchFamily="18" charset="0"/>
               </a:rPr>
-              <a:t>2</a:t>
-            </a:r>
-            <a:r>
-              <a:rPr lang="en-US" dirty="0" smtClean="0">
-                <a:latin typeface="Times New Roman" panose="02020603050405020304" pitchFamily="18" charset="0"/>
-                <a:cs typeface="Times New Roman" panose="02020603050405020304" pitchFamily="18" charset="0"/>
-              </a:rPr>
-              <a:t>. Biểu đồ phụ thuộc gói</a:t>
+              <a:t>2. Biểu đồ phụ thuộc gói</a:t>
             </a:r>
             <a:endParaRPr lang="en-US" dirty="0">
               <a:latin typeface="Times New Roman" panose="02020603050405020304" pitchFamily="18" charset="0"/>
@@ -8118,13 +8043,13 @@
         </p:nvSpPr>
         <p:spPr>
           <a:xfrm>
-            <a:off x="651934" y="1346201"/>
-            <a:ext cx="10098798" cy="4902199"/>
+            <a:off x="442929" y="992141"/>
+            <a:ext cx="10098798" cy="600165"/>
           </a:xfrm>
         </p:spPr>
         <p:txBody>
           <a:bodyPr>
-            <a:normAutofit/>
+            <a:normAutofit fontScale="85000" lnSpcReduction="20000"/>
           </a:bodyPr>
           <a:lstStyle/>
           <a:p>
@@ -8234,6 +8159,36 @@
           </a:p>
         </p:txBody>
       </p:sp>
+      <p:pic>
+        <p:nvPicPr>
+          <p:cNvPr id="5" name="Picture 4"/>
+          <p:cNvPicPr>
+            <a:picLocks noChangeAspect="1"/>
+          </p:cNvPicPr>
+          <p:nvPr/>
+        </p:nvPicPr>
+        <p:blipFill>
+          <a:blip r:embed="rId2">
+            <a:extLst>
+              <a:ext uri="{28A0092B-C50C-407E-A947-70E740481C1C}">
+                <a14:useLocalDpi xmlns:a14="http://schemas.microsoft.com/office/drawing/2010/main" val="0"/>
+              </a:ext>
+            </a:extLst>
+          </a:blip>
+          <a:stretch>
+            <a:fillRect/>
+          </a:stretch>
+        </p:blipFill>
+        <p:spPr>
+          <a:xfrm>
+            <a:off x="1097280" y="1423852"/>
+            <a:ext cx="9661371" cy="5434148"/>
+          </a:xfrm>
+          <a:prstGeom prst="rect">
+            <a:avLst/>
+          </a:prstGeom>
+        </p:spPr>
+      </p:pic>
     </p:spTree>
     <p:extLst>
       <p:ext uri="{BB962C8B-B14F-4D97-AF65-F5344CB8AC3E}">
@@ -8291,14 +8246,7 @@
                 <a:latin typeface="Times New Roman" panose="02020603050405020304" pitchFamily="18" charset="0"/>
                 <a:cs typeface="Times New Roman" panose="02020603050405020304" pitchFamily="18" charset="0"/>
               </a:rPr>
-              <a:t>4</a:t>
-            </a:r>
-            <a:r>
-              <a:rPr lang="en-US" dirty="0" smtClean="0">
-                <a:latin typeface="Times New Roman" panose="02020603050405020304" pitchFamily="18" charset="0"/>
-                <a:cs typeface="Times New Roman" panose="02020603050405020304" pitchFamily="18" charset="0"/>
-              </a:rPr>
-              <a:t>. Demo</a:t>
+              <a:t>4. Demo</a:t>
             </a:r>
             <a:endParaRPr lang="en-US" dirty="0">
               <a:latin typeface="Times New Roman" panose="02020603050405020304" pitchFamily="18" charset="0"/>

</xml_diff>